<commit_message>
feat(3_derivation): fix ppt error
</commit_message>
<xml_diff>
--- a/lessons/3_derivation/ppt/全连接层的前向和后向传播推导（上）.pptx
+++ b/lessons/3_derivation/ppt/全连接层的前向和后向传播推导（上）.pptx
@@ -231,7 +231,7 @@
                 <a:latin typeface="微软雅黑" panose="020B0503020204020204" charset="-122"/>
                 <a:ea typeface="微软雅黑" panose="020B0503020204020204" charset="-122"/>
               </a:rPr>
-              <a:t>2022/9/26</a:t>
+              <a:t>2022/10/18</a:t>
             </a:fld>
             <a:endParaRPr lang="zh-CN" altLang="en-US">
               <a:latin typeface="微软雅黑" panose="020B0503020204020204" charset="-122"/>
@@ -414,7 +414,7 @@
           <a:p>
             <a:fld id="{1AC49D05-6128-4D0D-A32A-06A5E73B386C}" type="datetimeFigureOut">
               <a:rPr lang="zh-CN" altLang="en-US" smtClean="0"/>
-              <a:t>2022/9/26</a:t>
+              <a:t>2022/10/18</a:t>
             </a:fld>
             <a:endParaRPr lang="zh-CN" altLang="en-US"/>
           </a:p>
@@ -1076,7 +1076,7 @@
           <a:p>
             <a:fld id="{9EFD9D74-47D9-4702-A33C-335B63B48DBF}" type="datetimeFigureOut">
               <a:rPr lang="zh-CN" altLang="en-US" smtClean="0"/>
-              <a:t>2022/9/26</a:t>
+              <a:t>2022/10/18</a:t>
             </a:fld>
             <a:endParaRPr lang="zh-CN" altLang="en-US" dirty="0"/>
           </a:p>
@@ -1409,7 +1409,7 @@
           <a:p>
             <a:fld id="{760FBDFE-C587-4B4C-A407-44438C67B59E}" type="datetimeFigureOut">
               <a:rPr lang="zh-CN" altLang="en-US" smtClean="0"/>
-              <a:t>2022/9/26</a:t>
+              <a:t>2022/10/18</a:t>
             </a:fld>
             <a:endParaRPr lang="zh-CN" altLang="en-US"/>
           </a:p>
@@ -1582,7 +1582,7 @@
           <a:p>
             <a:fld id="{9EFD9D74-47D9-4702-A33C-335B63B48DBF}" type="datetimeFigureOut">
               <a:rPr lang="zh-CN" altLang="en-US" smtClean="0"/>
-              <a:t>2022/9/26</a:t>
+              <a:t>2022/10/18</a:t>
             </a:fld>
             <a:endParaRPr lang="zh-CN" altLang="en-US" dirty="0"/>
           </a:p>
@@ -2107,7 +2107,7 @@
           <a:p>
             <a:fld id="{760FBDFE-C587-4B4C-A407-44438C67B59E}" type="datetimeFigureOut">
               <a:rPr lang="zh-CN" altLang="en-US" smtClean="0"/>
-              <a:t>2022/9/26</a:t>
+              <a:t>2022/10/18</a:t>
             </a:fld>
             <a:endParaRPr lang="zh-CN" altLang="en-US"/>
           </a:p>
@@ -2855,7 +2855,7 @@
           <a:p>
             <a:fld id="{760FBDFE-C587-4B4C-A407-44438C67B59E}" type="datetimeFigureOut">
               <a:rPr lang="zh-CN" altLang="en-US" smtClean="0"/>
-              <a:t>2022/9/26</a:t>
+              <a:t>2022/10/18</a:t>
             </a:fld>
             <a:endParaRPr lang="zh-CN" altLang="en-US"/>
           </a:p>
@@ -3021,7 +3021,7 @@
           <a:p>
             <a:fld id="{760FBDFE-C587-4B4C-A407-44438C67B59E}" type="datetimeFigureOut">
               <a:rPr lang="zh-CN" altLang="en-US" smtClean="0"/>
-              <a:t>2022/9/26</a:t>
+              <a:t>2022/10/18</a:t>
             </a:fld>
             <a:endParaRPr lang="zh-CN" altLang="en-US"/>
           </a:p>
@@ -3135,7 +3135,7 @@
           <a:p>
             <a:fld id="{760FBDFE-C587-4B4C-A407-44438C67B59E}" type="datetimeFigureOut">
               <a:rPr lang="zh-CN" altLang="en-US" smtClean="0"/>
-              <a:t>2022/9/26</a:t>
+              <a:t>2022/10/18</a:t>
             </a:fld>
             <a:endParaRPr lang="zh-CN" altLang="en-US"/>
           </a:p>
@@ -3465,7 +3465,7 @@
           <a:p>
             <a:fld id="{9EFD9D74-47D9-4702-A33C-335B63B48DBF}" type="datetimeFigureOut">
               <a:rPr lang="zh-CN" altLang="en-US" smtClean="0"/>
-              <a:t>2022/9/26</a:t>
+              <a:t>2022/10/18</a:t>
             </a:fld>
             <a:endParaRPr lang="zh-CN" altLang="en-US" dirty="0"/>
           </a:p>
@@ -3978,7 +3978,7 @@
           <a:p>
             <a:fld id="{760FBDFE-C587-4B4C-A407-44438C67B59E}" type="datetimeFigureOut">
               <a:rPr lang="zh-CN" altLang="en-US" smtClean="0"/>
-              <a:t>2022/9/26</a:t>
+              <a:t>2022/10/18</a:t>
             </a:fld>
             <a:endParaRPr lang="zh-CN" altLang="en-US"/>
           </a:p>
@@ -4092,7 +4092,7 @@
           <a:p>
             <a:fld id="{760FBDFE-C587-4B4C-A407-44438C67B59E}" type="datetimeFigureOut">
               <a:rPr lang="zh-CN" altLang="en-US" smtClean="0"/>
-              <a:t>2022/9/26</a:t>
+              <a:t>2022/10/18</a:t>
             </a:fld>
             <a:endParaRPr lang="zh-CN" altLang="en-US"/>
           </a:p>
@@ -4380,7 +4380,7 @@
           <a:p>
             <a:fld id="{82F288E0-7875-42C4-84C8-98DBBD3BF4D2}" type="datetimeFigureOut">
               <a:rPr lang="zh-CN" altLang="en-US" smtClean="0"/>
-              <a:t>2022/9/26</a:t>
+              <a:t>2022/10/18</a:t>
             </a:fld>
             <a:endParaRPr lang="zh-CN" altLang="en-US"/>
           </a:p>
@@ -4839,7 +4839,7 @@
           <a:p>
             <a:fld id="{760FBDFE-C587-4B4C-A407-44438C67B59E}" type="datetimeFigureOut">
               <a:rPr lang="zh-CN" altLang="en-US" smtClean="0"/>
-              <a:t>2022/9/26</a:t>
+              <a:t>2022/10/18</a:t>
             </a:fld>
             <a:endParaRPr lang="zh-CN" altLang="en-US"/>
           </a:p>
@@ -5508,7 +5508,7 @@
           <a:p>
             <a:fld id="{9EFD9D74-47D9-4702-A33C-335B63B48DBF}" type="datetimeFigureOut">
               <a:rPr lang="zh-CN" altLang="en-US" smtClean="0"/>
-              <a:t>2022/9/26</a:t>
+              <a:t>2022/10/18</a:t>
             </a:fld>
             <a:endParaRPr lang="zh-CN" altLang="en-US" dirty="0"/>
           </a:p>
@@ -5656,7 +5656,7 @@
           <a:p>
             <a:fld id="{9EFD9D74-47D9-4702-A33C-335B63B48DBF}" type="datetimeFigureOut">
               <a:rPr lang="zh-CN" altLang="en-US" smtClean="0"/>
-              <a:t>2022/9/26</a:t>
+              <a:t>2022/10/18</a:t>
             </a:fld>
             <a:endParaRPr lang="zh-CN" altLang="en-US" dirty="0"/>
           </a:p>
@@ -8634,17 +8634,6 @@
               <a:rPr lang="zh-CN" altLang="en-US" dirty="0"/>
               <a:t>主问题：向量化</a:t>
             </a:r>
-            <a:endParaRPr lang="en-US" altLang="zh-CN" dirty="0"/>
-          </a:p>
-          <a:p>
-            <a:pPr marL="285750" indent="-285750">
-              <a:buFont typeface="Arial" panose="020B0604020202020204" pitchFamily="34" charset="0"/>
-              <a:buChar char="•"/>
-            </a:pPr>
-            <a:r>
-              <a:rPr lang="zh-CN" altLang="en-US" dirty="0"/>
-              <a:t>主问题：如何推导全连接层的前向传播？</a:t>
-            </a:r>
           </a:p>
         </p:txBody>
       </p:sp>
@@ -8833,55 +8822,6 @@
                       </p:childTnLst>
                     </p:cTn>
                   </p:par>
-                  <p:par>
-                    <p:cTn id="15" fill="hold">
-                      <p:stCondLst>
-                        <p:cond delay="indefinite"/>
-                      </p:stCondLst>
-                      <p:childTnLst>
-                        <p:par>
-                          <p:cTn id="16" fill="hold">
-                            <p:stCondLst>
-                              <p:cond delay="0"/>
-                            </p:stCondLst>
-                            <p:childTnLst>
-                              <p:par>
-                                <p:cTn id="17" presetID="1" presetClass="entr" presetSubtype="0" fill="hold" grpId="0" nodeType="clickEffect">
-                                  <p:stCondLst>
-                                    <p:cond delay="0"/>
-                                  </p:stCondLst>
-                                  <p:childTnLst>
-                                    <p:set>
-                                      <p:cBhvr>
-                                        <p:cTn id="18" dur="1" fill="hold">
-                                          <p:stCondLst>
-                                            <p:cond delay="0"/>
-                                          </p:stCondLst>
-                                        </p:cTn>
-                                        <p:tgtEl>
-                                          <p:spTgt spid="2">
-                                            <p:txEl>
-                                              <p:pRg st="3" end="3"/>
-                                            </p:txEl>
-                                          </p:spTgt>
-                                        </p:tgtEl>
-                                        <p:attrNameLst>
-                                          <p:attrName>style.visibility</p:attrName>
-                                        </p:attrNameLst>
-                                      </p:cBhvr>
-                                      <p:to>
-                                        <p:strVal val="visible"/>
-                                      </p:to>
-                                    </p:set>
-                                  </p:childTnLst>
-                                </p:cTn>
-                              </p:par>
-                            </p:childTnLst>
-                          </p:cTn>
-                        </p:par>
-                      </p:childTnLst>
-                    </p:cTn>
-                  </p:par>
                 </p:childTnLst>
               </p:cTn>
               <p:prevCondLst>
@@ -9017,6 +8957,14 @@
               <a:rPr lang="zh-CN" altLang="en-US" dirty="0"/>
               <a:t>随机梯度下降算法是什么？</a:t>
             </a:r>
+            <a:endParaRPr lang="en-US" altLang="zh-CN" dirty="0"/>
+          </a:p>
+          <a:p>
+            <a:pPr marL="742950" lvl="1" indent="-285750">
+              <a:buFont typeface="Arial" panose="020B0604020202020204" pitchFamily="34" charset="0"/>
+              <a:buChar char="•"/>
+            </a:pPr>
+            <a:endParaRPr lang="zh-CN" altLang="en-US" dirty="0"/>
           </a:p>
           <a:p>
             <a:pPr marL="285750" indent="-285750">
@@ -9099,8 +9047,55 @@
         </p:blipFill>
         <p:spPr bwMode="auto">
           <a:xfrm>
-            <a:off x="6392517" y="2205467"/>
-            <a:ext cx="4680766" cy="3026298"/>
+            <a:off x="7664823" y="1486476"/>
+            <a:ext cx="3690848" cy="2386277"/>
+          </a:xfrm>
+          <a:prstGeom prst="rect">
+            <a:avLst/>
+          </a:prstGeom>
+          <a:noFill/>
+          <a:extLst>
+            <a:ext uri="{909E8E84-426E-40DD-AFC4-6F175D3DCCD1}">
+              <a14:hiddenFill xmlns:a14="http://schemas.microsoft.com/office/drawing/2010/main">
+                <a:solidFill>
+                  <a:srgbClr val="FFFFFF"/>
+                </a:solidFill>
+              </a14:hiddenFill>
+            </a:ext>
+          </a:extLst>
+        </p:spPr>
+      </p:pic>
+      <p:pic>
+        <p:nvPicPr>
+          <p:cNvPr id="4" name="Picture 2" descr="image">
+            <a:extLst>
+              <a:ext uri="{FF2B5EF4-FFF2-40B4-BE49-F238E27FC236}">
+                <a16:creationId xmlns:a16="http://schemas.microsoft.com/office/drawing/2014/main" id="{8E93D789-F9CE-CD64-9F4A-1F355237E22E}"/>
+              </a:ext>
+            </a:extLst>
+          </p:cNvPr>
+          <p:cNvPicPr>
+            <a:picLocks noChangeAspect="1" noChangeArrowheads="1"/>
+          </p:cNvPicPr>
+          <p:nvPr/>
+        </p:nvPicPr>
+        <p:blipFill>
+          <a:blip r:embed="rId5">
+            <a:extLst>
+              <a:ext uri="{28A0092B-C50C-407E-A947-70E740481C1C}">
+                <a14:useLocalDpi xmlns:a14="http://schemas.microsoft.com/office/drawing/2010/main" val="0"/>
+              </a:ext>
+            </a:extLst>
+          </a:blip>
+          <a:srcRect/>
+          <a:stretch>
+            <a:fillRect/>
+          </a:stretch>
+        </p:blipFill>
+        <p:spPr bwMode="auto">
+          <a:xfrm>
+            <a:off x="4997825" y="3845859"/>
+            <a:ext cx="2929156" cy="2985247"/>
           </a:xfrm>
           <a:prstGeom prst="rect">
             <a:avLst/>
@@ -9428,6 +9423,51 @@
                       </p:childTnLst>
                     </p:cTn>
                   </p:par>
+                  <p:par>
+                    <p:cTn id="27" fill="hold">
+                      <p:stCondLst>
+                        <p:cond delay="indefinite"/>
+                      </p:stCondLst>
+                      <p:childTnLst>
+                        <p:par>
+                          <p:cTn id="28" fill="hold">
+                            <p:stCondLst>
+                              <p:cond delay="0"/>
+                            </p:stCondLst>
+                            <p:childTnLst>
+                              <p:par>
+                                <p:cTn id="29" presetID="1" presetClass="entr" presetSubtype="0" fill="hold" nodeType="clickEffect">
+                                  <p:stCondLst>
+                                    <p:cond delay="0"/>
+                                  </p:stCondLst>
+                                  <p:childTnLst>
+                                    <p:set>
+                                      <p:cBhvr>
+                                        <p:cTn id="30" dur="1" fill="hold">
+                                          <p:stCondLst>
+                                            <p:cond delay="0"/>
+                                          </p:stCondLst>
+                                        </p:cTn>
+                                        <p:tgtEl>
+                                          <p:spTgt spid="4"/>
+                                        </p:tgtEl>
+                                        <p:attrNameLst>
+                                          <p:attrName>style.visibility</p:attrName>
+                                        </p:attrNameLst>
+                                      </p:cBhvr>
+                                      <p:to>
+                                        <p:strVal val="visible"/>
+                                      </p:to>
+                                    </p:set>
+                                  </p:childTnLst>
+                                </p:cTn>
+                              </p:par>
+                            </p:childTnLst>
+                          </p:cTn>
+                        </p:par>
+                      </p:childTnLst>
+                    </p:cTn>
+                  </p:par>
                 </p:childTnLst>
               </p:cTn>
               <p:prevCondLst>
@@ -9513,7 +9553,7 @@
             </a:pPr>
             <a:r>
               <a:rPr lang="zh-CN" altLang="en-US" dirty="0"/>
-              <a:t>如何才能不修改？</a:t>
+              <a:t>如何才能不修改公式，只调整参数即可？</a:t>
             </a:r>
             <a:endParaRPr lang="en-US" altLang="zh-CN" dirty="0"/>
           </a:p>
@@ -9847,11 +9887,7 @@
                                           </p:stCondLst>
                                         </p:cTn>
                                         <p:tgtEl>
-                                          <p:spTgt spid="2">
-                                            <p:txEl>
-                                              <p:pRg st="2" end="2"/>
-                                            </p:txEl>
-                                          </p:spTgt>
+                                          <p:spTgt spid="1028"/>
                                         </p:tgtEl>
                                         <p:attrNameLst>
                                           <p:attrName>style.visibility</p:attrName>
@@ -9896,7 +9932,11 @@
                                           </p:stCondLst>
                                         </p:cTn>
                                         <p:tgtEl>
-                                          <p:spTgt spid="1028"/>
+                                          <p:spTgt spid="2">
+                                            <p:txEl>
+                                              <p:pRg st="2" end="2"/>
+                                            </p:txEl>
+                                          </p:spTgt>
                                         </p:tgtEl>
                                         <p:attrNameLst>
                                           <p:attrName>style.visibility</p:attrName>
@@ -10105,7 +10145,7 @@
             </a:pPr>
             <a:r>
               <a:rPr lang="zh-CN" altLang="en-US" dirty="0"/>
-              <a:t>如果增加输入参数，如何解决下面的问题：</a:t>
+              <a:t>如果增加输入参数，那么：</a:t>
             </a:r>
             <a:endParaRPr lang="en-US" altLang="zh-CN" dirty="0"/>
           </a:p>
@@ -10119,20 +10159,6 @@
               <a:t>如何修改计算公式？</a:t>
             </a:r>
             <a:endParaRPr lang="en-US" altLang="zh-CN" dirty="0"/>
-          </a:p>
-          <a:p>
-            <a:pPr marL="742950" lvl="1" indent="-285750">
-              <a:buFont typeface="Arial" panose="020B0604020202020204" pitchFamily="34" charset="0"/>
-              <a:buChar char="•"/>
-            </a:pPr>
-            <a:r>
-              <a:rPr lang="zh-CN" altLang="en-US" dirty="0"/>
-              <a:t>避免计算过于臃肿</a:t>
-            </a:r>
-            <a:r>
-              <a:rPr lang="en-US" altLang="zh-CN" dirty="0"/>
-              <a:t>?</a:t>
-            </a:r>
           </a:p>
           <a:p>
             <a:pPr marL="742950" lvl="1" indent="-285750">
@@ -10573,55 +10599,6 @@
                       </p:childTnLst>
                     </p:cTn>
                   </p:par>
-                  <p:par>
-                    <p:cTn id="27" fill="hold">
-                      <p:stCondLst>
-                        <p:cond delay="indefinite"/>
-                      </p:stCondLst>
-                      <p:childTnLst>
-                        <p:par>
-                          <p:cTn id="28" fill="hold">
-                            <p:stCondLst>
-                              <p:cond delay="0"/>
-                            </p:stCondLst>
-                            <p:childTnLst>
-                              <p:par>
-                                <p:cTn id="29" presetID="1" presetClass="entr" presetSubtype="0" fill="hold" nodeType="clickEffect">
-                                  <p:stCondLst>
-                                    <p:cond delay="0"/>
-                                  </p:stCondLst>
-                                  <p:childTnLst>
-                                    <p:set>
-                                      <p:cBhvr>
-                                        <p:cTn id="30" dur="1" fill="hold">
-                                          <p:stCondLst>
-                                            <p:cond delay="0"/>
-                                          </p:stCondLst>
-                                        </p:cTn>
-                                        <p:tgtEl>
-                                          <p:spTgt spid="2">
-                                            <p:txEl>
-                                              <p:pRg st="4" end="4"/>
-                                            </p:txEl>
-                                          </p:spTgt>
-                                        </p:tgtEl>
-                                        <p:attrNameLst>
-                                          <p:attrName>style.visibility</p:attrName>
-                                        </p:attrNameLst>
-                                      </p:cBhvr>
-                                      <p:to>
-                                        <p:strVal val="visible"/>
-                                      </p:to>
-                                    </p:set>
-                                  </p:childTnLst>
-                                </p:cTn>
-                              </p:par>
-                            </p:childTnLst>
-                          </p:cTn>
-                        </p:par>
-                      </p:childTnLst>
-                    </p:cTn>
-                  </p:par>
                 </p:childTnLst>
               </p:cTn>
               <p:prevCondLst>
@@ -10722,7 +10699,7 @@
             </a:pPr>
             <a:r>
               <a:rPr lang="zh-CN" altLang="en-US" dirty="0"/>
-              <a:t>增加输入参数会改变公式的哪些地方？</a:t>
+              <a:t>增加输入参数的话需要改变公式吗？</a:t>
             </a:r>
             <a:endParaRPr lang="en-US" altLang="zh-CN" dirty="0"/>
           </a:p>
@@ -10937,10 +10914,10 @@
       </p:pic>
       <p:pic>
         <p:nvPicPr>
-          <p:cNvPr id="13" name="图片 12">
+          <p:cNvPr id="8" name="图片 7">
             <a:extLst>
               <a:ext uri="{FF2B5EF4-FFF2-40B4-BE49-F238E27FC236}">
-                <a16:creationId xmlns:a16="http://schemas.microsoft.com/office/drawing/2014/main" id="{1ACAAF44-85D2-8871-D213-0EB4553DF258}"/>
+                <a16:creationId xmlns:a16="http://schemas.microsoft.com/office/drawing/2014/main" id="{7BDEA614-406F-3266-6725-93E29D8AF534}"/>
               </a:ext>
             </a:extLst>
           </p:cNvPr>
@@ -10963,8 +10940,8 @@
         </p:blipFill>
         <p:spPr>
           <a:xfrm>
-            <a:off x="3517995" y="3490512"/>
-            <a:ext cx="5236789" cy="2960775"/>
+            <a:off x="3598749" y="3233112"/>
+            <a:ext cx="4994501" cy="2865697"/>
           </a:xfrm>
           <a:prstGeom prst="rect">
             <a:avLst/>
@@ -11201,7 +11178,7 @@
                                           </p:stCondLst>
                                         </p:cTn>
                                         <p:tgtEl>
-                                          <p:spTgt spid="13"/>
+                                          <p:spTgt spid="8"/>
                                         </p:tgtEl>
                                         <p:attrNameLst>
                                           <p:attrName>style.visibility</p:attrName>

</xml_diff>